<commit_message>
More slide infos - still WiP
</commit_message>
<xml_diff>
--- a/nuxeo-powerpoint-utils-core/src/test/resources/files/2020-Nuxeo-Overview-abstract.pptx
+++ b/nuxeo-powerpoint-utils-core/src/test/resources/files/2020-Nuxeo-Overview-abstract.pptx
@@ -3,25 +3,26 @@
 <p:presentation xmlns:a="http://schemas.openxmlformats.org/drawingml/2006/main" xmlns:r="http://schemas.openxmlformats.org/officeDocument/2006/relationships" xmlns:p="http://schemas.openxmlformats.org/presentationml/2006/main" strictFirstAndLastChars="0" saveSubsetFonts="1">
   <p:sldMasterIdLst>
     <p:sldMasterId id="2147483648" r:id="rId1"/>
+    <p:sldMasterId id="2147483690" r:id="rId2"/>
   </p:sldMasterIdLst>
   <p:notesMasterIdLst>
-    <p:notesMasterId r:id="rId13"/>
+    <p:notesMasterId r:id="rId14"/>
   </p:notesMasterIdLst>
   <p:handoutMasterIdLst>
-    <p:handoutMasterId r:id="rId14"/>
+    <p:handoutMasterId r:id="rId15"/>
   </p:handoutMasterIdLst>
   <p:sldIdLst>
-    <p:sldId id="297" r:id="rId2"/>
-    <p:sldId id="328" r:id="rId3"/>
-    <p:sldId id="1890" r:id="rId4"/>
-    <p:sldId id="1888" r:id="rId5"/>
-    <p:sldId id="2061" r:id="rId6"/>
-    <p:sldId id="1891" r:id="rId7"/>
-    <p:sldId id="1895" r:id="rId8"/>
-    <p:sldId id="336" r:id="rId9"/>
-    <p:sldId id="2048" r:id="rId10"/>
-    <p:sldId id="1864" r:id="rId11"/>
-    <p:sldId id="323" r:id="rId12"/>
+    <p:sldId id="297" r:id="rId3"/>
+    <p:sldId id="328" r:id="rId4"/>
+    <p:sldId id="1890" r:id="rId5"/>
+    <p:sldId id="1888" r:id="rId6"/>
+    <p:sldId id="2061" r:id="rId7"/>
+    <p:sldId id="1891" r:id="rId8"/>
+    <p:sldId id="1895" r:id="rId9"/>
+    <p:sldId id="336" r:id="rId10"/>
+    <p:sldId id="2048" r:id="rId11"/>
+    <p:sldId id="1864" r:id="rId12"/>
+    <p:sldId id="323" r:id="rId13"/>
   </p:sldIdLst>
   <p:sldSz cx="12192000" cy="6858000"/>
   <p:notesSz cx="6858000" cy="9144000"/>
@@ -244,7 +245,7 @@
           <a:p>
             <a:fld id="{79C599CB-E54E-124C-BBC7-8047AD031DA3}" type="datetimeFigureOut">
               <a:rPr lang="en-US" smtClean="0"/>
-              <a:t>2/13/20</a:t>
+              <a:t>2/14/20</a:t>
             </a:fld>
             <a:endParaRPr lang="en-US"/>
           </a:p>
@@ -409,7 +410,7 @@
           <a:p>
             <a:fld id="{54EA3F34-81B4-1C41-ACD7-F88FBD45CA5F}" type="datetimeFigureOut">
               <a:rPr lang="en-US" smtClean="0"/>
-              <a:t>2/13/20</a:t>
+              <a:t>2/14/20</a:t>
             </a:fld>
             <a:endParaRPr lang="en-US"/>
           </a:p>
@@ -2289,6 +2290,693 @@
       </p:transition>
     </mc:Fallback>
   </mc:AlternateContent>
+</p:sldLayout>
+</file>
+
+<file path=ppt/slideLayouts/slideLayout10.xml><?xml version="1.0" encoding="utf-8"?>
+<p:sldLayout xmlns:a="http://schemas.openxmlformats.org/drawingml/2006/main" xmlns:r="http://schemas.openxmlformats.org/officeDocument/2006/relationships" xmlns:p="http://schemas.openxmlformats.org/presentationml/2006/main" type="title" preserve="1">
+  <p:cSld name="Main1">
+    <p:spTree>
+      <p:nvGrpSpPr>
+        <p:cNvPr id="1" name=""/>
+        <p:cNvGrpSpPr/>
+        <p:nvPr/>
+      </p:nvGrpSpPr>
+      <p:grpSpPr>
+        <a:xfrm>
+          <a:off x="0" y="0"/>
+          <a:ext cx="0" cy="0"/>
+          <a:chOff x="0" y="0"/>
+          <a:chExt cx="0" cy="0"/>
+        </a:xfrm>
+      </p:grpSpPr>
+      <p:sp>
+        <p:nvSpPr>
+          <p:cNvPr id="2" name="Title 1">
+            <a:extLst>
+              <a:ext uri="{FF2B5EF4-FFF2-40B4-BE49-F238E27FC236}">
+                <a16:creationId xmlns:a16="http://schemas.microsoft.com/office/drawing/2014/main" id="{2F54C361-2F5F-6A4F-9A87-5C9C6C0BFE06}"/>
+              </a:ext>
+            </a:extLst>
+          </p:cNvPr>
+          <p:cNvSpPr>
+            <a:spLocks noGrp="1"/>
+          </p:cNvSpPr>
+          <p:nvPr>
+            <p:ph type="ctrTitle"/>
+          </p:nvPr>
+        </p:nvSpPr>
+        <p:spPr>
+          <a:xfrm>
+            <a:off x="1524000" y="1122363"/>
+            <a:ext cx="9144000" cy="2387600"/>
+          </a:xfrm>
+        </p:spPr>
+        <p:txBody>
+          <a:bodyPr anchor="b"/>
+          <a:lstStyle>
+            <a:lvl1pPr algn="ctr">
+              <a:defRPr sz="6000"/>
+            </a:lvl1pPr>
+          </a:lstStyle>
+          <a:p>
+            <a:r>
+              <a:rPr lang="en-US"/>
+              <a:t>Click to edit Master title style</a:t>
+            </a:r>
+          </a:p>
+        </p:txBody>
+      </p:sp>
+      <p:sp>
+        <p:nvSpPr>
+          <p:cNvPr id="3" name="Subtitle 2">
+            <a:extLst>
+              <a:ext uri="{FF2B5EF4-FFF2-40B4-BE49-F238E27FC236}">
+                <a16:creationId xmlns:a16="http://schemas.microsoft.com/office/drawing/2014/main" id="{77EB4732-F430-D84B-8227-D746C00D7AD1}"/>
+              </a:ext>
+            </a:extLst>
+          </p:cNvPr>
+          <p:cNvSpPr>
+            <a:spLocks noGrp="1"/>
+          </p:cNvSpPr>
+          <p:nvPr>
+            <p:ph type="subTitle" idx="1"/>
+          </p:nvPr>
+        </p:nvSpPr>
+        <p:spPr>
+          <a:xfrm>
+            <a:off x="1524000" y="3602038"/>
+            <a:ext cx="9144000" cy="1655762"/>
+          </a:xfrm>
+        </p:spPr>
+        <p:txBody>
+          <a:bodyPr/>
+          <a:lstStyle>
+            <a:lvl1pPr marL="0" indent="0" algn="ctr">
+              <a:buNone/>
+              <a:defRPr sz="2400"/>
+            </a:lvl1pPr>
+            <a:lvl2pPr marL="457200" indent="0" algn="ctr">
+              <a:buNone/>
+              <a:defRPr sz="2000"/>
+            </a:lvl2pPr>
+            <a:lvl3pPr marL="914400" indent="0" algn="ctr">
+              <a:buNone/>
+              <a:defRPr sz="1800"/>
+            </a:lvl3pPr>
+            <a:lvl4pPr marL="1371600" indent="0" algn="ctr">
+              <a:buNone/>
+              <a:defRPr sz="1600"/>
+            </a:lvl4pPr>
+            <a:lvl5pPr marL="1828800" indent="0" algn="ctr">
+              <a:buNone/>
+              <a:defRPr sz="1600"/>
+            </a:lvl5pPr>
+            <a:lvl6pPr marL="2286000" indent="0" algn="ctr">
+              <a:buNone/>
+              <a:defRPr sz="1600"/>
+            </a:lvl6pPr>
+            <a:lvl7pPr marL="2743200" indent="0" algn="ctr">
+              <a:buNone/>
+              <a:defRPr sz="1600"/>
+            </a:lvl7pPr>
+            <a:lvl8pPr marL="3200400" indent="0" algn="ctr">
+              <a:buNone/>
+              <a:defRPr sz="1600"/>
+            </a:lvl8pPr>
+            <a:lvl9pPr marL="3657600" indent="0" algn="ctr">
+              <a:buNone/>
+              <a:defRPr sz="1600"/>
+            </a:lvl9pPr>
+          </a:lstStyle>
+          <a:p>
+            <a:r>
+              <a:rPr lang="en-US"/>
+              <a:t>Click to edit Master subtitle style</a:t>
+            </a:r>
+          </a:p>
+        </p:txBody>
+      </p:sp>
+      <p:sp>
+        <p:nvSpPr>
+          <p:cNvPr id="4" name="Date Placeholder 3">
+            <a:extLst>
+              <a:ext uri="{FF2B5EF4-FFF2-40B4-BE49-F238E27FC236}">
+                <a16:creationId xmlns:a16="http://schemas.microsoft.com/office/drawing/2014/main" id="{7F1717DE-08B7-964D-9598-CEEFE2B81FE1}"/>
+              </a:ext>
+            </a:extLst>
+          </p:cNvPr>
+          <p:cNvSpPr>
+            <a:spLocks noGrp="1"/>
+          </p:cNvSpPr>
+          <p:nvPr>
+            <p:ph type="dt" sz="half" idx="10"/>
+          </p:nvPr>
+        </p:nvSpPr>
+        <p:spPr/>
+        <p:txBody>
+          <a:bodyPr/>
+          <a:lstStyle/>
+          <a:p>
+            <a:fld id="{BE35BAFC-87A2-A946-8C8E-7B9A161A94C5}" type="datetimeFigureOut">
+              <a:t>2/14/20</a:t>
+            </a:fld>
+            <a:endParaRPr lang="en-US"/>
+          </a:p>
+        </p:txBody>
+      </p:sp>
+      <p:sp>
+        <p:nvSpPr>
+          <p:cNvPr id="5" name="Footer Placeholder 4">
+            <a:extLst>
+              <a:ext uri="{FF2B5EF4-FFF2-40B4-BE49-F238E27FC236}">
+                <a16:creationId xmlns:a16="http://schemas.microsoft.com/office/drawing/2014/main" id="{41C1EBBD-7B4D-3C44-B29A-A861636A7653}"/>
+              </a:ext>
+            </a:extLst>
+          </p:cNvPr>
+          <p:cNvSpPr>
+            <a:spLocks noGrp="1"/>
+          </p:cNvSpPr>
+          <p:nvPr>
+            <p:ph type="ftr" sz="quarter" idx="11"/>
+          </p:nvPr>
+        </p:nvSpPr>
+        <p:spPr/>
+        <p:txBody>
+          <a:bodyPr/>
+          <a:lstStyle/>
+          <a:p>
+            <a:endParaRPr lang="en-US"/>
+          </a:p>
+        </p:txBody>
+      </p:sp>
+      <p:sp>
+        <p:nvSpPr>
+          <p:cNvPr id="6" name="Slide Number Placeholder 5">
+            <a:extLst>
+              <a:ext uri="{FF2B5EF4-FFF2-40B4-BE49-F238E27FC236}">
+                <a16:creationId xmlns:a16="http://schemas.microsoft.com/office/drawing/2014/main" id="{300D9B19-5D0E-A34A-B2C1-CFFCC5A9E412}"/>
+              </a:ext>
+            </a:extLst>
+          </p:cNvPr>
+          <p:cNvSpPr>
+            <a:spLocks noGrp="1"/>
+          </p:cNvSpPr>
+          <p:nvPr>
+            <p:ph type="sldNum" sz="quarter" idx="12"/>
+          </p:nvPr>
+        </p:nvSpPr>
+        <p:spPr/>
+        <p:txBody>
+          <a:bodyPr/>
+          <a:lstStyle/>
+          <a:p>
+            <a:fld id="{AEB32D2D-86F0-0848-82FE-A856BF1C0799}" type="slidenum">
+              <a:t>‹#›</a:t>
+            </a:fld>
+            <a:endParaRPr lang="en-US"/>
+          </a:p>
+        </p:txBody>
+      </p:sp>
+    </p:spTree>
+    <p:extLst>
+      <p:ext uri="{BB962C8B-B14F-4D97-AF65-F5344CB8AC3E}">
+        <p14:creationId xmlns:p14="http://schemas.microsoft.com/office/powerpoint/2010/main" val="1671630135"/>
+      </p:ext>
+    </p:extLst>
+  </p:cSld>
+  <p:clrMapOvr>
+    <a:masterClrMapping/>
+  </p:clrMapOvr>
+</p:sldLayout>
+</file>
+
+<file path=ppt/slideLayouts/slideLayout11.xml><?xml version="1.0" encoding="utf-8"?>
+<p:sldLayout xmlns:a="http://schemas.openxmlformats.org/drawingml/2006/main" xmlns:r="http://schemas.openxmlformats.org/officeDocument/2006/relationships" xmlns:p="http://schemas.openxmlformats.org/presentationml/2006/main" type="obj" preserve="1">
+  <p:cSld name="Main2">
+    <p:spTree>
+      <p:nvGrpSpPr>
+        <p:cNvPr id="1" name=""/>
+        <p:cNvGrpSpPr/>
+        <p:nvPr/>
+      </p:nvGrpSpPr>
+      <p:grpSpPr>
+        <a:xfrm>
+          <a:off x="0" y="0"/>
+          <a:ext cx="0" cy="0"/>
+          <a:chOff x="0" y="0"/>
+          <a:chExt cx="0" cy="0"/>
+        </a:xfrm>
+      </p:grpSpPr>
+      <p:sp>
+        <p:nvSpPr>
+          <p:cNvPr id="2" name="Title 1">
+            <a:extLst>
+              <a:ext uri="{FF2B5EF4-FFF2-40B4-BE49-F238E27FC236}">
+                <a16:creationId xmlns:a16="http://schemas.microsoft.com/office/drawing/2014/main" id="{27B0A594-8F6A-1443-BFB3-9E21F55DF01F}"/>
+              </a:ext>
+            </a:extLst>
+          </p:cNvPr>
+          <p:cNvSpPr>
+            <a:spLocks noGrp="1"/>
+          </p:cNvSpPr>
+          <p:nvPr>
+            <p:ph type="title"/>
+          </p:nvPr>
+        </p:nvSpPr>
+        <p:spPr/>
+        <p:txBody>
+          <a:bodyPr/>
+          <a:lstStyle/>
+          <a:p>
+            <a:r>
+              <a:rPr lang="en-US"/>
+              <a:t>Click to edit Master title style</a:t>
+            </a:r>
+          </a:p>
+        </p:txBody>
+      </p:sp>
+      <p:sp>
+        <p:nvSpPr>
+          <p:cNvPr id="3" name="Content Placeholder 2">
+            <a:extLst>
+              <a:ext uri="{FF2B5EF4-FFF2-40B4-BE49-F238E27FC236}">
+                <a16:creationId xmlns:a16="http://schemas.microsoft.com/office/drawing/2014/main" id="{C8CA6F94-D3FB-E240-8EC8-50800EC319BB}"/>
+              </a:ext>
+            </a:extLst>
+          </p:cNvPr>
+          <p:cNvSpPr>
+            <a:spLocks noGrp="1"/>
+          </p:cNvSpPr>
+          <p:nvPr>
+            <p:ph idx="1"/>
+          </p:nvPr>
+        </p:nvSpPr>
+        <p:spPr/>
+        <p:txBody>
+          <a:bodyPr/>
+          <a:lstStyle/>
+          <a:p>
+            <a:pPr lvl="0"/>
+            <a:r>
+              <a:rPr lang="en-US"/>
+              <a:t>Click to edit Master text styles</a:t>
+            </a:r>
+          </a:p>
+          <a:p>
+            <a:pPr lvl="1"/>
+            <a:r>
+              <a:rPr lang="en-US"/>
+              <a:t>Second level</a:t>
+            </a:r>
+          </a:p>
+          <a:p>
+            <a:pPr lvl="2"/>
+            <a:r>
+              <a:rPr lang="en-US"/>
+              <a:t>Third level</a:t>
+            </a:r>
+          </a:p>
+          <a:p>
+            <a:pPr lvl="3"/>
+            <a:r>
+              <a:rPr lang="en-US"/>
+              <a:t>Fourth level</a:t>
+            </a:r>
+          </a:p>
+          <a:p>
+            <a:pPr lvl="4"/>
+            <a:r>
+              <a:rPr lang="en-US"/>
+              <a:t>Fifth level</a:t>
+            </a:r>
+          </a:p>
+        </p:txBody>
+      </p:sp>
+      <p:sp>
+        <p:nvSpPr>
+          <p:cNvPr id="4" name="Date Placeholder 3">
+            <a:extLst>
+              <a:ext uri="{FF2B5EF4-FFF2-40B4-BE49-F238E27FC236}">
+                <a16:creationId xmlns:a16="http://schemas.microsoft.com/office/drawing/2014/main" id="{F3FD81AC-957E-BE4D-9C1D-6D90AF6C78C6}"/>
+              </a:ext>
+            </a:extLst>
+          </p:cNvPr>
+          <p:cNvSpPr>
+            <a:spLocks noGrp="1"/>
+          </p:cNvSpPr>
+          <p:nvPr>
+            <p:ph type="dt" sz="half" idx="10"/>
+          </p:nvPr>
+        </p:nvSpPr>
+        <p:spPr/>
+        <p:txBody>
+          <a:bodyPr/>
+          <a:lstStyle/>
+          <a:p>
+            <a:fld id="{BE35BAFC-87A2-A946-8C8E-7B9A161A94C5}" type="datetimeFigureOut">
+              <a:t>2/14/20</a:t>
+            </a:fld>
+            <a:endParaRPr lang="en-US"/>
+          </a:p>
+        </p:txBody>
+      </p:sp>
+      <p:sp>
+        <p:nvSpPr>
+          <p:cNvPr id="5" name="Footer Placeholder 4">
+            <a:extLst>
+              <a:ext uri="{FF2B5EF4-FFF2-40B4-BE49-F238E27FC236}">
+                <a16:creationId xmlns:a16="http://schemas.microsoft.com/office/drawing/2014/main" id="{67D7D63B-6861-CD4F-B3AD-5ADCB5F2E1D3}"/>
+              </a:ext>
+            </a:extLst>
+          </p:cNvPr>
+          <p:cNvSpPr>
+            <a:spLocks noGrp="1"/>
+          </p:cNvSpPr>
+          <p:nvPr>
+            <p:ph type="ftr" sz="quarter" idx="11"/>
+          </p:nvPr>
+        </p:nvSpPr>
+        <p:spPr/>
+        <p:txBody>
+          <a:bodyPr/>
+          <a:lstStyle/>
+          <a:p>
+            <a:endParaRPr lang="en-US"/>
+          </a:p>
+        </p:txBody>
+      </p:sp>
+      <p:sp>
+        <p:nvSpPr>
+          <p:cNvPr id="6" name="Slide Number Placeholder 5">
+            <a:extLst>
+              <a:ext uri="{FF2B5EF4-FFF2-40B4-BE49-F238E27FC236}">
+                <a16:creationId xmlns:a16="http://schemas.microsoft.com/office/drawing/2014/main" id="{F04386C1-8FED-9042-A52D-177C9D964F9D}"/>
+              </a:ext>
+            </a:extLst>
+          </p:cNvPr>
+          <p:cNvSpPr>
+            <a:spLocks noGrp="1"/>
+          </p:cNvSpPr>
+          <p:nvPr>
+            <p:ph type="sldNum" sz="quarter" idx="12"/>
+          </p:nvPr>
+        </p:nvSpPr>
+        <p:spPr/>
+        <p:txBody>
+          <a:bodyPr/>
+          <a:lstStyle/>
+          <a:p>
+            <a:fld id="{AEB32D2D-86F0-0848-82FE-A856BF1C0799}" type="slidenum">
+              <a:t>‹#›</a:t>
+            </a:fld>
+            <a:endParaRPr lang="en-US"/>
+          </a:p>
+        </p:txBody>
+      </p:sp>
+    </p:spTree>
+    <p:extLst>
+      <p:ext uri="{BB962C8B-B14F-4D97-AF65-F5344CB8AC3E}">
+        <p14:creationId xmlns:p14="http://schemas.microsoft.com/office/powerpoint/2010/main" val="1759705639"/>
+      </p:ext>
+    </p:extLst>
+  </p:cSld>
+  <p:clrMapOvr>
+    <a:masterClrMapping/>
+  </p:clrMapOvr>
+</p:sldLayout>
+</file>
+
+<file path=ppt/slideLayouts/slideLayout12.xml><?xml version="1.0" encoding="utf-8"?>
+<p:sldLayout xmlns:a="http://schemas.openxmlformats.org/drawingml/2006/main" xmlns:r="http://schemas.openxmlformats.org/officeDocument/2006/relationships" xmlns:p="http://schemas.openxmlformats.org/presentationml/2006/main" type="secHead" preserve="1">
+  <p:cSld name="Main3">
+    <p:spTree>
+      <p:nvGrpSpPr>
+        <p:cNvPr id="1" name=""/>
+        <p:cNvGrpSpPr/>
+        <p:nvPr/>
+      </p:nvGrpSpPr>
+      <p:grpSpPr>
+        <a:xfrm>
+          <a:off x="0" y="0"/>
+          <a:ext cx="0" cy="0"/>
+          <a:chOff x="0" y="0"/>
+          <a:chExt cx="0" cy="0"/>
+        </a:xfrm>
+      </p:grpSpPr>
+      <p:sp>
+        <p:nvSpPr>
+          <p:cNvPr id="2" name="Title 1">
+            <a:extLst>
+              <a:ext uri="{FF2B5EF4-FFF2-40B4-BE49-F238E27FC236}">
+                <a16:creationId xmlns:a16="http://schemas.microsoft.com/office/drawing/2014/main" id="{D439CD47-16AD-784B-B1B8-4AFEC6906969}"/>
+              </a:ext>
+            </a:extLst>
+          </p:cNvPr>
+          <p:cNvSpPr>
+            <a:spLocks noGrp="1"/>
+          </p:cNvSpPr>
+          <p:nvPr>
+            <p:ph type="title"/>
+          </p:nvPr>
+        </p:nvSpPr>
+        <p:spPr>
+          <a:xfrm>
+            <a:off x="831850" y="1709738"/>
+            <a:ext cx="10515600" cy="2852737"/>
+          </a:xfrm>
+        </p:spPr>
+        <p:txBody>
+          <a:bodyPr anchor="b"/>
+          <a:lstStyle>
+            <a:lvl1pPr>
+              <a:defRPr sz="6000"/>
+            </a:lvl1pPr>
+          </a:lstStyle>
+          <a:p>
+            <a:r>
+              <a:rPr lang="en-US"/>
+              <a:t>Click to edit Master title style</a:t>
+            </a:r>
+          </a:p>
+        </p:txBody>
+      </p:sp>
+      <p:sp>
+        <p:nvSpPr>
+          <p:cNvPr id="3" name="Text Placeholder 2">
+            <a:extLst>
+              <a:ext uri="{FF2B5EF4-FFF2-40B4-BE49-F238E27FC236}">
+                <a16:creationId xmlns:a16="http://schemas.microsoft.com/office/drawing/2014/main" id="{59B61D2F-EDC7-8A49-B96B-6A9E0807BF1B}"/>
+              </a:ext>
+            </a:extLst>
+          </p:cNvPr>
+          <p:cNvSpPr>
+            <a:spLocks noGrp="1"/>
+          </p:cNvSpPr>
+          <p:nvPr>
+            <p:ph type="body" idx="1"/>
+          </p:nvPr>
+        </p:nvSpPr>
+        <p:spPr>
+          <a:xfrm>
+            <a:off x="831850" y="4589463"/>
+            <a:ext cx="10515600" cy="1500187"/>
+          </a:xfrm>
+        </p:spPr>
+        <p:txBody>
+          <a:bodyPr/>
+          <a:lstStyle>
+            <a:lvl1pPr marL="0" indent="0">
+              <a:buNone/>
+              <a:defRPr sz="2400">
+                <a:solidFill>
+                  <a:schemeClr val="tx1">
+                    <a:tint val="75000"/>
+                  </a:schemeClr>
+                </a:solidFill>
+              </a:defRPr>
+            </a:lvl1pPr>
+            <a:lvl2pPr marL="457200" indent="0">
+              <a:buNone/>
+              <a:defRPr sz="2000">
+                <a:solidFill>
+                  <a:schemeClr val="tx1">
+                    <a:tint val="75000"/>
+                  </a:schemeClr>
+                </a:solidFill>
+              </a:defRPr>
+            </a:lvl2pPr>
+            <a:lvl3pPr marL="914400" indent="0">
+              <a:buNone/>
+              <a:defRPr sz="1800">
+                <a:solidFill>
+                  <a:schemeClr val="tx1">
+                    <a:tint val="75000"/>
+                  </a:schemeClr>
+                </a:solidFill>
+              </a:defRPr>
+            </a:lvl3pPr>
+            <a:lvl4pPr marL="1371600" indent="0">
+              <a:buNone/>
+              <a:defRPr sz="1600">
+                <a:solidFill>
+                  <a:schemeClr val="tx1">
+                    <a:tint val="75000"/>
+                  </a:schemeClr>
+                </a:solidFill>
+              </a:defRPr>
+            </a:lvl4pPr>
+            <a:lvl5pPr marL="1828800" indent="0">
+              <a:buNone/>
+              <a:defRPr sz="1600">
+                <a:solidFill>
+                  <a:schemeClr val="tx1">
+                    <a:tint val="75000"/>
+                  </a:schemeClr>
+                </a:solidFill>
+              </a:defRPr>
+            </a:lvl5pPr>
+            <a:lvl6pPr marL="2286000" indent="0">
+              <a:buNone/>
+              <a:defRPr sz="1600">
+                <a:solidFill>
+                  <a:schemeClr val="tx1">
+                    <a:tint val="75000"/>
+                  </a:schemeClr>
+                </a:solidFill>
+              </a:defRPr>
+            </a:lvl6pPr>
+            <a:lvl7pPr marL="2743200" indent="0">
+              <a:buNone/>
+              <a:defRPr sz="1600">
+                <a:solidFill>
+                  <a:schemeClr val="tx1">
+                    <a:tint val="75000"/>
+                  </a:schemeClr>
+                </a:solidFill>
+              </a:defRPr>
+            </a:lvl7pPr>
+            <a:lvl8pPr marL="3200400" indent="0">
+              <a:buNone/>
+              <a:defRPr sz="1600">
+                <a:solidFill>
+                  <a:schemeClr val="tx1">
+                    <a:tint val="75000"/>
+                  </a:schemeClr>
+                </a:solidFill>
+              </a:defRPr>
+            </a:lvl8pPr>
+            <a:lvl9pPr marL="3657600" indent="0">
+              <a:buNone/>
+              <a:defRPr sz="1600">
+                <a:solidFill>
+                  <a:schemeClr val="tx1">
+                    <a:tint val="75000"/>
+                  </a:schemeClr>
+                </a:solidFill>
+              </a:defRPr>
+            </a:lvl9pPr>
+          </a:lstStyle>
+          <a:p>
+            <a:pPr lvl="0"/>
+            <a:r>
+              <a:rPr lang="en-US"/>
+              <a:t>Click to edit Master text styles</a:t>
+            </a:r>
+          </a:p>
+        </p:txBody>
+      </p:sp>
+      <p:sp>
+        <p:nvSpPr>
+          <p:cNvPr id="4" name="Date Placeholder 3">
+            <a:extLst>
+              <a:ext uri="{FF2B5EF4-FFF2-40B4-BE49-F238E27FC236}">
+                <a16:creationId xmlns:a16="http://schemas.microsoft.com/office/drawing/2014/main" id="{D6A2768D-2809-9B49-930A-65477D262B1C}"/>
+              </a:ext>
+            </a:extLst>
+          </p:cNvPr>
+          <p:cNvSpPr>
+            <a:spLocks noGrp="1"/>
+          </p:cNvSpPr>
+          <p:nvPr>
+            <p:ph type="dt" sz="half" idx="10"/>
+          </p:nvPr>
+        </p:nvSpPr>
+        <p:spPr/>
+        <p:txBody>
+          <a:bodyPr/>
+          <a:lstStyle/>
+          <a:p>
+            <a:fld id="{BE35BAFC-87A2-A946-8C8E-7B9A161A94C5}" type="datetimeFigureOut">
+              <a:t>2/14/20</a:t>
+            </a:fld>
+            <a:endParaRPr lang="en-US"/>
+          </a:p>
+        </p:txBody>
+      </p:sp>
+      <p:sp>
+        <p:nvSpPr>
+          <p:cNvPr id="5" name="Footer Placeholder 4">
+            <a:extLst>
+              <a:ext uri="{FF2B5EF4-FFF2-40B4-BE49-F238E27FC236}">
+                <a16:creationId xmlns:a16="http://schemas.microsoft.com/office/drawing/2014/main" id="{380CB29F-7C1D-3949-86FA-DB4ECC63A785}"/>
+              </a:ext>
+            </a:extLst>
+          </p:cNvPr>
+          <p:cNvSpPr>
+            <a:spLocks noGrp="1"/>
+          </p:cNvSpPr>
+          <p:nvPr>
+            <p:ph type="ftr" sz="quarter" idx="11"/>
+          </p:nvPr>
+        </p:nvSpPr>
+        <p:spPr/>
+        <p:txBody>
+          <a:bodyPr/>
+          <a:lstStyle/>
+          <a:p>
+            <a:endParaRPr lang="en-US"/>
+          </a:p>
+        </p:txBody>
+      </p:sp>
+      <p:sp>
+        <p:nvSpPr>
+          <p:cNvPr id="6" name="Slide Number Placeholder 5">
+            <a:extLst>
+              <a:ext uri="{FF2B5EF4-FFF2-40B4-BE49-F238E27FC236}">
+                <a16:creationId xmlns:a16="http://schemas.microsoft.com/office/drawing/2014/main" id="{5AA3665A-0652-044B-BAE9-FCE3554520C4}"/>
+              </a:ext>
+            </a:extLst>
+          </p:cNvPr>
+          <p:cNvSpPr>
+            <a:spLocks noGrp="1"/>
+          </p:cNvSpPr>
+          <p:nvPr>
+            <p:ph type="sldNum" sz="quarter" idx="12"/>
+          </p:nvPr>
+        </p:nvSpPr>
+        <p:spPr/>
+        <p:txBody>
+          <a:bodyPr/>
+          <a:lstStyle/>
+          <a:p>
+            <a:fld id="{AEB32D2D-86F0-0848-82FE-A856BF1C0799}" type="slidenum">
+              <a:t>‹#›</a:t>
+            </a:fld>
+            <a:endParaRPr lang="en-US"/>
+          </a:p>
+        </p:txBody>
+      </p:sp>
+    </p:spTree>
+    <p:extLst>
+      <p:ext uri="{BB962C8B-B14F-4D97-AF65-F5344CB8AC3E}">
+        <p14:creationId xmlns:p14="http://schemas.microsoft.com/office/powerpoint/2010/main" val="1896742398"/>
+      </p:ext>
+    </p:extLst>
+  </p:cSld>
+  <p:clrMapOvr>
+    <a:masterClrMapping/>
+  </p:clrMapOvr>
 </p:sldLayout>
 </file>
 
@@ -5934,6 +6622,564 @@
         <a:buFont typeface="Wingdings" charset="2"/>
         <a:buChar char="§"/>
         <a:defRPr sz="1200" kern="1200">
+          <a:solidFill>
+            <a:schemeClr val="tx1"/>
+          </a:solidFill>
+          <a:latin typeface="+mn-lt"/>
+          <a:ea typeface="+mn-ea"/>
+          <a:cs typeface="+mn-cs"/>
+        </a:defRPr>
+      </a:lvl5pPr>
+      <a:lvl6pPr marL="2514600" indent="-228600" algn="l" defTabSz="914400" rtl="0" eaLnBrk="1" latinLnBrk="0" hangingPunct="1">
+        <a:lnSpc>
+          <a:spcPct val="90000"/>
+        </a:lnSpc>
+        <a:spcBef>
+          <a:spcPts val="500"/>
+        </a:spcBef>
+        <a:buFont typeface="Arial" panose="020B0604020202020204" pitchFamily="34" charset="0"/>
+        <a:buChar char="•"/>
+        <a:defRPr sz="1800" kern="1200">
+          <a:solidFill>
+            <a:schemeClr val="tx1"/>
+          </a:solidFill>
+          <a:latin typeface="+mn-lt"/>
+          <a:ea typeface="+mn-ea"/>
+          <a:cs typeface="+mn-cs"/>
+        </a:defRPr>
+      </a:lvl6pPr>
+      <a:lvl7pPr marL="2971800" indent="-228600" algn="l" defTabSz="914400" rtl="0" eaLnBrk="1" latinLnBrk="0" hangingPunct="1">
+        <a:lnSpc>
+          <a:spcPct val="90000"/>
+        </a:lnSpc>
+        <a:spcBef>
+          <a:spcPts val="500"/>
+        </a:spcBef>
+        <a:buFont typeface="Arial" panose="020B0604020202020204" pitchFamily="34" charset="0"/>
+        <a:buChar char="•"/>
+        <a:defRPr sz="1800" kern="1200">
+          <a:solidFill>
+            <a:schemeClr val="tx1"/>
+          </a:solidFill>
+          <a:latin typeface="+mn-lt"/>
+          <a:ea typeface="+mn-ea"/>
+          <a:cs typeface="+mn-cs"/>
+        </a:defRPr>
+      </a:lvl7pPr>
+      <a:lvl8pPr marL="3429000" indent="-228600" algn="l" defTabSz="914400" rtl="0" eaLnBrk="1" latinLnBrk="0" hangingPunct="1">
+        <a:lnSpc>
+          <a:spcPct val="90000"/>
+        </a:lnSpc>
+        <a:spcBef>
+          <a:spcPts val="500"/>
+        </a:spcBef>
+        <a:buFont typeface="Arial" panose="020B0604020202020204" pitchFamily="34" charset="0"/>
+        <a:buChar char="•"/>
+        <a:defRPr sz="1800" kern="1200">
+          <a:solidFill>
+            <a:schemeClr val="tx1"/>
+          </a:solidFill>
+          <a:latin typeface="+mn-lt"/>
+          <a:ea typeface="+mn-ea"/>
+          <a:cs typeface="+mn-cs"/>
+        </a:defRPr>
+      </a:lvl8pPr>
+      <a:lvl9pPr marL="3886200" indent="-228600" algn="l" defTabSz="914400" rtl="0" eaLnBrk="1" latinLnBrk="0" hangingPunct="1">
+        <a:lnSpc>
+          <a:spcPct val="90000"/>
+        </a:lnSpc>
+        <a:spcBef>
+          <a:spcPts val="500"/>
+        </a:spcBef>
+        <a:buFont typeface="Arial" panose="020B0604020202020204" pitchFamily="34" charset="0"/>
+        <a:buChar char="•"/>
+        <a:defRPr sz="1800" kern="1200">
+          <a:solidFill>
+            <a:schemeClr val="tx1"/>
+          </a:solidFill>
+          <a:latin typeface="+mn-lt"/>
+          <a:ea typeface="+mn-ea"/>
+          <a:cs typeface="+mn-cs"/>
+        </a:defRPr>
+      </a:lvl9pPr>
+    </p:bodyStyle>
+    <p:otherStyle>
+      <a:defPPr>
+        <a:defRPr lang="en-US"/>
+      </a:defPPr>
+      <a:lvl1pPr marL="0" algn="l" defTabSz="914400" rtl="0" eaLnBrk="1" latinLnBrk="0" hangingPunct="1">
+        <a:defRPr sz="1800" kern="1200">
+          <a:solidFill>
+            <a:schemeClr val="tx1"/>
+          </a:solidFill>
+          <a:latin typeface="+mn-lt"/>
+          <a:ea typeface="+mn-ea"/>
+          <a:cs typeface="+mn-cs"/>
+        </a:defRPr>
+      </a:lvl1pPr>
+      <a:lvl2pPr marL="457200" algn="l" defTabSz="914400" rtl="0" eaLnBrk="1" latinLnBrk="0" hangingPunct="1">
+        <a:defRPr sz="1800" kern="1200">
+          <a:solidFill>
+            <a:schemeClr val="tx1"/>
+          </a:solidFill>
+          <a:latin typeface="+mn-lt"/>
+          <a:ea typeface="+mn-ea"/>
+          <a:cs typeface="+mn-cs"/>
+        </a:defRPr>
+      </a:lvl2pPr>
+      <a:lvl3pPr marL="914400" algn="l" defTabSz="914400" rtl="0" eaLnBrk="1" latinLnBrk="0" hangingPunct="1">
+        <a:defRPr sz="1800" kern="1200">
+          <a:solidFill>
+            <a:schemeClr val="tx1"/>
+          </a:solidFill>
+          <a:latin typeface="+mn-lt"/>
+          <a:ea typeface="+mn-ea"/>
+          <a:cs typeface="+mn-cs"/>
+        </a:defRPr>
+      </a:lvl3pPr>
+      <a:lvl4pPr marL="1371600" algn="l" defTabSz="914400" rtl="0" eaLnBrk="1" latinLnBrk="0" hangingPunct="1">
+        <a:defRPr sz="1800" kern="1200">
+          <a:solidFill>
+            <a:schemeClr val="tx1"/>
+          </a:solidFill>
+          <a:latin typeface="+mn-lt"/>
+          <a:ea typeface="+mn-ea"/>
+          <a:cs typeface="+mn-cs"/>
+        </a:defRPr>
+      </a:lvl4pPr>
+      <a:lvl5pPr marL="1828800" algn="l" defTabSz="914400" rtl="0" eaLnBrk="1" latinLnBrk="0" hangingPunct="1">
+        <a:defRPr sz="1800" kern="1200">
+          <a:solidFill>
+            <a:schemeClr val="tx1"/>
+          </a:solidFill>
+          <a:latin typeface="+mn-lt"/>
+          <a:ea typeface="+mn-ea"/>
+          <a:cs typeface="+mn-cs"/>
+        </a:defRPr>
+      </a:lvl5pPr>
+      <a:lvl6pPr marL="2286000" algn="l" defTabSz="914400" rtl="0" eaLnBrk="1" latinLnBrk="0" hangingPunct="1">
+        <a:defRPr sz="1800" kern="1200">
+          <a:solidFill>
+            <a:schemeClr val="tx1"/>
+          </a:solidFill>
+          <a:latin typeface="+mn-lt"/>
+          <a:ea typeface="+mn-ea"/>
+          <a:cs typeface="+mn-cs"/>
+        </a:defRPr>
+      </a:lvl6pPr>
+      <a:lvl7pPr marL="2743200" algn="l" defTabSz="914400" rtl="0" eaLnBrk="1" latinLnBrk="0" hangingPunct="1">
+        <a:defRPr sz="1800" kern="1200">
+          <a:solidFill>
+            <a:schemeClr val="tx1"/>
+          </a:solidFill>
+          <a:latin typeface="+mn-lt"/>
+          <a:ea typeface="+mn-ea"/>
+          <a:cs typeface="+mn-cs"/>
+        </a:defRPr>
+      </a:lvl7pPr>
+      <a:lvl8pPr marL="3200400" algn="l" defTabSz="914400" rtl="0" eaLnBrk="1" latinLnBrk="0" hangingPunct="1">
+        <a:defRPr sz="1800" kern="1200">
+          <a:solidFill>
+            <a:schemeClr val="tx1"/>
+          </a:solidFill>
+          <a:latin typeface="+mn-lt"/>
+          <a:ea typeface="+mn-ea"/>
+          <a:cs typeface="+mn-cs"/>
+        </a:defRPr>
+      </a:lvl8pPr>
+      <a:lvl9pPr marL="3657600" algn="l" defTabSz="914400" rtl="0" eaLnBrk="1" latinLnBrk="0" hangingPunct="1">
+        <a:defRPr sz="1800" kern="1200">
+          <a:solidFill>
+            <a:schemeClr val="tx1"/>
+          </a:solidFill>
+          <a:latin typeface="+mn-lt"/>
+          <a:ea typeface="+mn-ea"/>
+          <a:cs typeface="+mn-cs"/>
+        </a:defRPr>
+      </a:lvl9pPr>
+    </p:otherStyle>
+  </p:txStyles>
+</p:sldMaster>
+</file>
+
+<file path=ppt/slideMasters/slideMaster2.xml><?xml version="1.0" encoding="utf-8"?>
+<p:sldMaster xmlns:a="http://schemas.openxmlformats.org/drawingml/2006/main" xmlns:r="http://schemas.openxmlformats.org/officeDocument/2006/relationships" xmlns:p="http://schemas.openxmlformats.org/presentationml/2006/main" preserve="1">
+  <p:cSld>
+    <p:bg>
+      <p:bgRef idx="1001">
+        <a:schemeClr val="bg1"/>
+      </p:bgRef>
+    </p:bg>
+    <p:spTree>
+      <p:nvGrpSpPr>
+        <p:cNvPr id="1" name=""/>
+        <p:cNvGrpSpPr/>
+        <p:nvPr/>
+      </p:nvGrpSpPr>
+      <p:grpSpPr>
+        <a:xfrm>
+          <a:off x="0" y="0"/>
+          <a:ext cx="0" cy="0"/>
+          <a:chOff x="0" y="0"/>
+          <a:chExt cx="0" cy="0"/>
+        </a:xfrm>
+      </p:grpSpPr>
+      <p:sp>
+        <p:nvSpPr>
+          <p:cNvPr id="2" name="Title Placeholder 1">
+            <a:extLst>
+              <a:ext uri="{FF2B5EF4-FFF2-40B4-BE49-F238E27FC236}">
+                <a16:creationId xmlns:a16="http://schemas.microsoft.com/office/drawing/2014/main" id="{4E3B6F1C-092F-124F-9C4E-72C80BD84F51}"/>
+              </a:ext>
+            </a:extLst>
+          </p:cNvPr>
+          <p:cNvSpPr>
+            <a:spLocks noGrp="1"/>
+          </p:cNvSpPr>
+          <p:nvPr>
+            <p:ph type="title"/>
+          </p:nvPr>
+        </p:nvSpPr>
+        <p:spPr>
+          <a:xfrm>
+            <a:off x="838200" y="365125"/>
+            <a:ext cx="10515600" cy="1325563"/>
+          </a:xfrm>
+          <a:prstGeom prst="rect">
+            <a:avLst/>
+          </a:prstGeom>
+        </p:spPr>
+        <p:txBody>
+          <a:bodyPr vert="horz" lIns="91440" tIns="45720" rIns="91440" bIns="45720" rtlCol="0" anchor="ctr">
+            <a:normAutofit/>
+          </a:bodyPr>
+          <a:lstStyle/>
+          <a:p>
+            <a:r>
+              <a:rPr lang="en-US"/>
+              <a:t>Click to edit Master title style</a:t>
+            </a:r>
+          </a:p>
+        </p:txBody>
+      </p:sp>
+      <p:sp>
+        <p:nvSpPr>
+          <p:cNvPr id="3" name="Text Placeholder 2">
+            <a:extLst>
+              <a:ext uri="{FF2B5EF4-FFF2-40B4-BE49-F238E27FC236}">
+                <a16:creationId xmlns:a16="http://schemas.microsoft.com/office/drawing/2014/main" id="{19214110-75E9-E243-ACB2-6C1164C829C3}"/>
+              </a:ext>
+            </a:extLst>
+          </p:cNvPr>
+          <p:cNvSpPr>
+            <a:spLocks noGrp="1"/>
+          </p:cNvSpPr>
+          <p:nvPr>
+            <p:ph type="body" idx="1"/>
+          </p:nvPr>
+        </p:nvSpPr>
+        <p:spPr>
+          <a:xfrm>
+            <a:off x="838200" y="1825625"/>
+            <a:ext cx="10515600" cy="4351338"/>
+          </a:xfrm>
+          <a:prstGeom prst="rect">
+            <a:avLst/>
+          </a:prstGeom>
+        </p:spPr>
+        <p:txBody>
+          <a:bodyPr vert="horz" lIns="91440" tIns="45720" rIns="91440" bIns="45720" rtlCol="0">
+            <a:normAutofit/>
+          </a:bodyPr>
+          <a:lstStyle/>
+          <a:p>
+            <a:pPr lvl="0"/>
+            <a:r>
+              <a:rPr lang="en-US"/>
+              <a:t>Click to edit Master text styles</a:t>
+            </a:r>
+          </a:p>
+          <a:p>
+            <a:pPr lvl="1"/>
+            <a:r>
+              <a:rPr lang="en-US"/>
+              <a:t>Second level</a:t>
+            </a:r>
+          </a:p>
+          <a:p>
+            <a:pPr lvl="2"/>
+            <a:r>
+              <a:rPr lang="en-US"/>
+              <a:t>Third level</a:t>
+            </a:r>
+          </a:p>
+          <a:p>
+            <a:pPr lvl="3"/>
+            <a:r>
+              <a:rPr lang="en-US"/>
+              <a:t>Fourth level</a:t>
+            </a:r>
+          </a:p>
+          <a:p>
+            <a:pPr lvl="4"/>
+            <a:r>
+              <a:rPr lang="en-US"/>
+              <a:t>Fifth level</a:t>
+            </a:r>
+          </a:p>
+        </p:txBody>
+      </p:sp>
+      <p:sp>
+        <p:nvSpPr>
+          <p:cNvPr id="4" name="Date Placeholder 3">
+            <a:extLst>
+              <a:ext uri="{FF2B5EF4-FFF2-40B4-BE49-F238E27FC236}">
+                <a16:creationId xmlns:a16="http://schemas.microsoft.com/office/drawing/2014/main" id="{7D222A76-7321-5B4E-AC0B-A2C8B27959D3}"/>
+              </a:ext>
+            </a:extLst>
+          </p:cNvPr>
+          <p:cNvSpPr>
+            <a:spLocks noGrp="1"/>
+          </p:cNvSpPr>
+          <p:nvPr>
+            <p:ph type="dt" sz="half" idx="2"/>
+          </p:nvPr>
+        </p:nvSpPr>
+        <p:spPr>
+          <a:xfrm>
+            <a:off x="838200" y="6356350"/>
+            <a:ext cx="2743200" cy="365125"/>
+          </a:xfrm>
+          <a:prstGeom prst="rect">
+            <a:avLst/>
+          </a:prstGeom>
+        </p:spPr>
+        <p:txBody>
+          <a:bodyPr vert="horz" lIns="91440" tIns="45720" rIns="91440" bIns="45720" rtlCol="0" anchor="ctr"/>
+          <a:lstStyle>
+            <a:lvl1pPr algn="l">
+              <a:defRPr sz="1200">
+                <a:solidFill>
+                  <a:schemeClr val="tx1">
+                    <a:tint val="75000"/>
+                  </a:schemeClr>
+                </a:solidFill>
+              </a:defRPr>
+            </a:lvl1pPr>
+          </a:lstStyle>
+          <a:p>
+            <a:fld id="{BE35BAFC-87A2-A946-8C8E-7B9A161A94C5}" type="datetimeFigureOut">
+              <a:t>2/14/20</a:t>
+            </a:fld>
+            <a:endParaRPr lang="en-US"/>
+          </a:p>
+        </p:txBody>
+      </p:sp>
+      <p:sp>
+        <p:nvSpPr>
+          <p:cNvPr id="5" name="Footer Placeholder 4">
+            <a:extLst>
+              <a:ext uri="{FF2B5EF4-FFF2-40B4-BE49-F238E27FC236}">
+                <a16:creationId xmlns:a16="http://schemas.microsoft.com/office/drawing/2014/main" id="{F0DF3A21-44E7-D642-865F-F3D7F4586835}"/>
+              </a:ext>
+            </a:extLst>
+          </p:cNvPr>
+          <p:cNvSpPr>
+            <a:spLocks noGrp="1"/>
+          </p:cNvSpPr>
+          <p:nvPr>
+            <p:ph type="ftr" sz="quarter" idx="3"/>
+          </p:nvPr>
+        </p:nvSpPr>
+        <p:spPr>
+          <a:xfrm>
+            <a:off x="4038600" y="6356350"/>
+            <a:ext cx="4114800" cy="365125"/>
+          </a:xfrm>
+          <a:prstGeom prst="rect">
+            <a:avLst/>
+          </a:prstGeom>
+        </p:spPr>
+        <p:txBody>
+          <a:bodyPr vert="horz" lIns="91440" tIns="45720" rIns="91440" bIns="45720" rtlCol="0" anchor="ctr"/>
+          <a:lstStyle>
+            <a:lvl1pPr algn="ctr">
+              <a:defRPr sz="1200">
+                <a:solidFill>
+                  <a:schemeClr val="tx1">
+                    <a:tint val="75000"/>
+                  </a:schemeClr>
+                </a:solidFill>
+              </a:defRPr>
+            </a:lvl1pPr>
+          </a:lstStyle>
+          <a:p>
+            <a:endParaRPr lang="en-US"/>
+          </a:p>
+        </p:txBody>
+      </p:sp>
+      <p:sp>
+        <p:nvSpPr>
+          <p:cNvPr id="6" name="Slide Number Placeholder 5">
+            <a:extLst>
+              <a:ext uri="{FF2B5EF4-FFF2-40B4-BE49-F238E27FC236}">
+                <a16:creationId xmlns:a16="http://schemas.microsoft.com/office/drawing/2014/main" id="{9A0BE338-E317-7242-B7E7-3E0BAEC9B4E2}"/>
+              </a:ext>
+            </a:extLst>
+          </p:cNvPr>
+          <p:cNvSpPr>
+            <a:spLocks noGrp="1"/>
+          </p:cNvSpPr>
+          <p:nvPr>
+            <p:ph type="sldNum" sz="quarter" idx="4"/>
+          </p:nvPr>
+        </p:nvSpPr>
+        <p:spPr>
+          <a:xfrm>
+            <a:off x="8610600" y="6356350"/>
+            <a:ext cx="2743200" cy="365125"/>
+          </a:xfrm>
+          <a:prstGeom prst="rect">
+            <a:avLst/>
+          </a:prstGeom>
+        </p:spPr>
+        <p:txBody>
+          <a:bodyPr vert="horz" lIns="91440" tIns="45720" rIns="91440" bIns="45720" rtlCol="0" anchor="ctr"/>
+          <a:lstStyle>
+            <a:lvl1pPr algn="r">
+              <a:defRPr sz="1200">
+                <a:solidFill>
+                  <a:schemeClr val="tx1">
+                    <a:tint val="75000"/>
+                  </a:schemeClr>
+                </a:solidFill>
+              </a:defRPr>
+            </a:lvl1pPr>
+          </a:lstStyle>
+          <a:p>
+            <a:fld id="{AEB32D2D-86F0-0848-82FE-A856BF1C0799}" type="slidenum">
+              <a:t>‹#›</a:t>
+            </a:fld>
+            <a:endParaRPr lang="en-US"/>
+          </a:p>
+        </p:txBody>
+      </p:sp>
+    </p:spTree>
+    <p:extLst>
+      <p:ext uri="{BB962C8B-B14F-4D97-AF65-F5344CB8AC3E}">
+        <p14:creationId xmlns:p14="http://schemas.microsoft.com/office/powerpoint/2010/main" val="2641217396"/>
+      </p:ext>
+    </p:extLst>
+  </p:cSld>
+  <p:clrMap bg1="lt1" tx1="dk1" bg2="lt2" tx2="dk2" accent1="accent1" accent2="accent2" accent3="accent3" accent4="accent4" accent5="accent5" accent6="accent6" hlink="hlink" folHlink="folHlink"/>
+  <p:sldLayoutIdLst>
+    <p:sldLayoutId id="2147483691" r:id="rId1"/>
+    <p:sldLayoutId id="2147483692" r:id="rId2"/>
+    <p:sldLayoutId id="2147483693" r:id="rId3"/>
+  </p:sldLayoutIdLst>
+  <p:txStyles>
+    <p:titleStyle>
+      <a:lvl1pPr algn="l" defTabSz="914400" rtl="0" eaLnBrk="1" latinLnBrk="0" hangingPunct="1">
+        <a:lnSpc>
+          <a:spcPct val="90000"/>
+        </a:lnSpc>
+        <a:spcBef>
+          <a:spcPct val="0"/>
+        </a:spcBef>
+        <a:buNone/>
+        <a:defRPr sz="4400" kern="1200">
+          <a:solidFill>
+            <a:schemeClr val="tx1"/>
+          </a:solidFill>
+          <a:latin typeface="+mj-lt"/>
+          <a:ea typeface="+mj-ea"/>
+          <a:cs typeface="+mj-cs"/>
+        </a:defRPr>
+      </a:lvl1pPr>
+    </p:titleStyle>
+    <p:bodyStyle>
+      <a:lvl1pPr marL="228600" indent="-228600" algn="l" defTabSz="914400" rtl="0" eaLnBrk="1" latinLnBrk="0" hangingPunct="1">
+        <a:lnSpc>
+          <a:spcPct val="90000"/>
+        </a:lnSpc>
+        <a:spcBef>
+          <a:spcPts val="1000"/>
+        </a:spcBef>
+        <a:buFont typeface="Arial" panose="020B0604020202020204" pitchFamily="34" charset="0"/>
+        <a:buChar char="•"/>
+        <a:defRPr sz="2800" kern="1200">
+          <a:solidFill>
+            <a:schemeClr val="tx1"/>
+          </a:solidFill>
+          <a:latin typeface="+mn-lt"/>
+          <a:ea typeface="+mn-ea"/>
+          <a:cs typeface="+mn-cs"/>
+        </a:defRPr>
+      </a:lvl1pPr>
+      <a:lvl2pPr marL="685800" indent="-228600" algn="l" defTabSz="914400" rtl="0" eaLnBrk="1" latinLnBrk="0" hangingPunct="1">
+        <a:lnSpc>
+          <a:spcPct val="90000"/>
+        </a:lnSpc>
+        <a:spcBef>
+          <a:spcPts val="500"/>
+        </a:spcBef>
+        <a:buFont typeface="Arial" panose="020B0604020202020204" pitchFamily="34" charset="0"/>
+        <a:buChar char="•"/>
+        <a:defRPr sz="2400" kern="1200">
+          <a:solidFill>
+            <a:schemeClr val="tx1"/>
+          </a:solidFill>
+          <a:latin typeface="+mn-lt"/>
+          <a:ea typeface="+mn-ea"/>
+          <a:cs typeface="+mn-cs"/>
+        </a:defRPr>
+      </a:lvl2pPr>
+      <a:lvl3pPr marL="1143000" indent="-228600" algn="l" defTabSz="914400" rtl="0" eaLnBrk="1" latinLnBrk="0" hangingPunct="1">
+        <a:lnSpc>
+          <a:spcPct val="90000"/>
+        </a:lnSpc>
+        <a:spcBef>
+          <a:spcPts val="500"/>
+        </a:spcBef>
+        <a:buFont typeface="Arial" panose="020B0604020202020204" pitchFamily="34" charset="0"/>
+        <a:buChar char="•"/>
+        <a:defRPr sz="2000" kern="1200">
+          <a:solidFill>
+            <a:schemeClr val="tx1"/>
+          </a:solidFill>
+          <a:latin typeface="+mn-lt"/>
+          <a:ea typeface="+mn-ea"/>
+          <a:cs typeface="+mn-cs"/>
+        </a:defRPr>
+      </a:lvl3pPr>
+      <a:lvl4pPr marL="1600200" indent="-228600" algn="l" defTabSz="914400" rtl="0" eaLnBrk="1" latinLnBrk="0" hangingPunct="1">
+        <a:lnSpc>
+          <a:spcPct val="90000"/>
+        </a:lnSpc>
+        <a:spcBef>
+          <a:spcPts val="500"/>
+        </a:spcBef>
+        <a:buFont typeface="Arial" panose="020B0604020202020204" pitchFamily="34" charset="0"/>
+        <a:buChar char="•"/>
+        <a:defRPr sz="1800" kern="1200">
+          <a:solidFill>
+            <a:schemeClr val="tx1"/>
+          </a:solidFill>
+          <a:latin typeface="+mn-lt"/>
+          <a:ea typeface="+mn-ea"/>
+          <a:cs typeface="+mn-cs"/>
+        </a:defRPr>
+      </a:lvl4pPr>
+      <a:lvl5pPr marL="2057400" indent="-228600" algn="l" defTabSz="914400" rtl="0" eaLnBrk="1" latinLnBrk="0" hangingPunct="1">
+        <a:lnSpc>
+          <a:spcPct val="90000"/>
+        </a:lnSpc>
+        <a:spcBef>
+          <a:spcPts val="500"/>
+        </a:spcBef>
+        <a:buFont typeface="Arial" panose="020B0604020202020204" pitchFamily="34" charset="0"/>
+        <a:buChar char="•"/>
+        <a:defRPr sz="1800" kern="1200">
           <a:solidFill>
             <a:schemeClr val="tx1"/>
           </a:solidFill>
@@ -26014,7 +27260,7 @@
 </file>
 
 <file path=ppt/theme/theme2.xml><?xml version="1.0" encoding="utf-8"?>
-<a:theme xmlns:a="http://schemas.openxmlformats.org/drawingml/2006/main" name="Office Theme">
+<a:theme xmlns:a="http://schemas.openxmlformats.org/drawingml/2006/main" name="Unit Test Second Theme">
   <a:themeElements>
     <a:clrScheme name="Office">
       <a:dk1>
@@ -26059,9 +27305,9 @@
         <a:latin typeface="Calibri Light" panose="020F0302020204030204"/>
         <a:ea typeface=""/>
         <a:cs typeface=""/>
-        <a:font script="Jpan" typeface="Yu Gothic Light"/>
+        <a:font script="Jpan" typeface="游ゴシック Light"/>
         <a:font script="Hang" typeface="맑은 고딕"/>
-        <a:font script="Hans" typeface="DengXian Light"/>
+        <a:font script="Hans" typeface="等线 Light"/>
         <a:font script="Hant" typeface="新細明體"/>
         <a:font script="Arab" typeface="Times New Roman"/>
         <a:font script="Hebr" typeface="Times New Roman"/>
@@ -26089,14 +27335,31 @@
         <a:font script="Viet" typeface="Times New Roman"/>
         <a:font script="Uigh" typeface="Microsoft Uighur"/>
         <a:font script="Geor" typeface="Sylfaen"/>
+        <a:font script="Armn" typeface="Arial"/>
+        <a:font script="Bugi" typeface="Leelawadee UI"/>
+        <a:font script="Bopo" typeface="Microsoft JhengHei"/>
+        <a:font script="Java" typeface="Javanese Text"/>
+        <a:font script="Lisu" typeface="Segoe UI"/>
+        <a:font script="Mymr" typeface="Myanmar Text"/>
+        <a:font script="Nkoo" typeface="Ebrima"/>
+        <a:font script="Olck" typeface="Nirmala UI"/>
+        <a:font script="Osma" typeface="Ebrima"/>
+        <a:font script="Phag" typeface="Phagspa"/>
+        <a:font script="Syrn" typeface="Estrangelo Edessa"/>
+        <a:font script="Syrj" typeface="Estrangelo Edessa"/>
+        <a:font script="Syre" typeface="Estrangelo Edessa"/>
+        <a:font script="Sora" typeface="Nirmala UI"/>
+        <a:font script="Tale" typeface="Microsoft Tai Le"/>
+        <a:font script="Talu" typeface="Microsoft New Tai Lue"/>
+        <a:font script="Tfng" typeface="Ebrima"/>
       </a:majorFont>
       <a:minorFont>
         <a:latin typeface="Calibri" panose="020F0502020204030204"/>
         <a:ea typeface=""/>
         <a:cs typeface=""/>
-        <a:font script="Jpan" typeface="Yu Gothic"/>
+        <a:font script="Jpan" typeface="游ゴシック"/>
         <a:font script="Hang" typeface="맑은 고딕"/>
-        <a:font script="Hans" typeface="DengXian"/>
+        <a:font script="Hans" typeface="等线"/>
         <a:font script="Hant" typeface="新細明體"/>
         <a:font script="Arab" typeface="Arial"/>
         <a:font script="Hebr" typeface="Arial"/>
@@ -26124,6 +27387,23 @@
         <a:font script="Viet" typeface="Arial"/>
         <a:font script="Uigh" typeface="Microsoft Uighur"/>
         <a:font script="Geor" typeface="Sylfaen"/>
+        <a:font script="Armn" typeface="Arial"/>
+        <a:font script="Bugi" typeface="Leelawadee UI"/>
+        <a:font script="Bopo" typeface="Microsoft JhengHei"/>
+        <a:font script="Java" typeface="Javanese Text"/>
+        <a:font script="Lisu" typeface="Segoe UI"/>
+        <a:font script="Mymr" typeface="Myanmar Text"/>
+        <a:font script="Nkoo" typeface="Ebrima"/>
+        <a:font script="Olck" typeface="Nirmala UI"/>
+        <a:font script="Osma" typeface="Ebrima"/>
+        <a:font script="Phag" typeface="Phagspa"/>
+        <a:font script="Syrn" typeface="Estrangelo Edessa"/>
+        <a:font script="Syrj" typeface="Estrangelo Edessa"/>
+        <a:font script="Syre" typeface="Estrangelo Edessa"/>
+        <a:font script="Sora" typeface="Nirmala UI"/>
+        <a:font script="Tale" typeface="Microsoft Tai Le"/>
+        <a:font script="Talu" typeface="Microsoft New Tai Lue"/>
+        <a:font script="Tfng" typeface="Ebrima"/>
       </a:minorFont>
     </a:fontScheme>
     <a:fmtScheme name="Office">
@@ -26533,4 +27813,265 @@
     </a:ext>
   </a:extLst>
 </a:theme>
+</file>
+
+<file path=ppt/theme/theme4.xml><?xml version="1.0" encoding="utf-8"?>
+<a:theme xmlns:a="http://schemas.openxmlformats.org/drawingml/2006/main" name="Office Theme">
+  <a:themeElements>
+    <a:clrScheme name="Office">
+      <a:dk1>
+        <a:sysClr val="windowText" lastClr="000000"/>
+      </a:dk1>
+      <a:lt1>
+        <a:sysClr val="window" lastClr="FFFFFF"/>
+      </a:lt1>
+      <a:dk2>
+        <a:srgbClr val="44546A"/>
+      </a:dk2>
+      <a:lt2>
+        <a:srgbClr val="E7E6E6"/>
+      </a:lt2>
+      <a:accent1>
+        <a:srgbClr val="4472C4"/>
+      </a:accent1>
+      <a:accent2>
+        <a:srgbClr val="ED7D31"/>
+      </a:accent2>
+      <a:accent3>
+        <a:srgbClr val="A5A5A5"/>
+      </a:accent3>
+      <a:accent4>
+        <a:srgbClr val="FFC000"/>
+      </a:accent4>
+      <a:accent5>
+        <a:srgbClr val="5B9BD5"/>
+      </a:accent5>
+      <a:accent6>
+        <a:srgbClr val="70AD47"/>
+      </a:accent6>
+      <a:hlink>
+        <a:srgbClr val="0563C1"/>
+      </a:hlink>
+      <a:folHlink>
+        <a:srgbClr val="954F72"/>
+      </a:folHlink>
+    </a:clrScheme>
+    <a:fontScheme name="Office">
+      <a:majorFont>
+        <a:latin typeface="Calibri Light" panose="020F0302020204030204"/>
+        <a:ea typeface=""/>
+        <a:cs typeface=""/>
+        <a:font script="Jpan" typeface="Yu Gothic Light"/>
+        <a:font script="Hang" typeface="맑은 고딕"/>
+        <a:font script="Hans" typeface="DengXian Light"/>
+        <a:font script="Hant" typeface="新細明體"/>
+        <a:font script="Arab" typeface="Times New Roman"/>
+        <a:font script="Hebr" typeface="Times New Roman"/>
+        <a:font script="Thai" typeface="Angsana New"/>
+        <a:font script="Ethi" typeface="Nyala"/>
+        <a:font script="Beng" typeface="Vrinda"/>
+        <a:font script="Gujr" typeface="Shruti"/>
+        <a:font script="Khmr" typeface="MoolBoran"/>
+        <a:font script="Knda" typeface="Tunga"/>
+        <a:font script="Guru" typeface="Raavi"/>
+        <a:font script="Cans" typeface="Euphemia"/>
+        <a:font script="Cher" typeface="Plantagenet Cherokee"/>
+        <a:font script="Yiii" typeface="Microsoft Yi Baiti"/>
+        <a:font script="Tibt" typeface="Microsoft Himalaya"/>
+        <a:font script="Thaa" typeface="MV Boli"/>
+        <a:font script="Deva" typeface="Mangal"/>
+        <a:font script="Telu" typeface="Gautami"/>
+        <a:font script="Taml" typeface="Latha"/>
+        <a:font script="Syrc" typeface="Estrangelo Edessa"/>
+        <a:font script="Orya" typeface="Kalinga"/>
+        <a:font script="Mlym" typeface="Kartika"/>
+        <a:font script="Laoo" typeface="DokChampa"/>
+        <a:font script="Sinh" typeface="Iskoola Pota"/>
+        <a:font script="Mong" typeface="Mongolian Baiti"/>
+        <a:font script="Viet" typeface="Times New Roman"/>
+        <a:font script="Uigh" typeface="Microsoft Uighur"/>
+        <a:font script="Geor" typeface="Sylfaen"/>
+      </a:majorFont>
+      <a:minorFont>
+        <a:latin typeface="Calibri" panose="020F0502020204030204"/>
+        <a:ea typeface=""/>
+        <a:cs typeface=""/>
+        <a:font script="Jpan" typeface="Yu Gothic"/>
+        <a:font script="Hang" typeface="맑은 고딕"/>
+        <a:font script="Hans" typeface="DengXian"/>
+        <a:font script="Hant" typeface="新細明體"/>
+        <a:font script="Arab" typeface="Arial"/>
+        <a:font script="Hebr" typeface="Arial"/>
+        <a:font script="Thai" typeface="Cordia New"/>
+        <a:font script="Ethi" typeface="Nyala"/>
+        <a:font script="Beng" typeface="Vrinda"/>
+        <a:font script="Gujr" typeface="Shruti"/>
+        <a:font script="Khmr" typeface="DaunPenh"/>
+        <a:font script="Knda" typeface="Tunga"/>
+        <a:font script="Guru" typeface="Raavi"/>
+        <a:font script="Cans" typeface="Euphemia"/>
+        <a:font script="Cher" typeface="Plantagenet Cherokee"/>
+        <a:font script="Yiii" typeface="Microsoft Yi Baiti"/>
+        <a:font script="Tibt" typeface="Microsoft Himalaya"/>
+        <a:font script="Thaa" typeface="MV Boli"/>
+        <a:font script="Deva" typeface="Mangal"/>
+        <a:font script="Telu" typeface="Gautami"/>
+        <a:font script="Taml" typeface="Latha"/>
+        <a:font script="Syrc" typeface="Estrangelo Edessa"/>
+        <a:font script="Orya" typeface="Kalinga"/>
+        <a:font script="Mlym" typeface="Kartika"/>
+        <a:font script="Laoo" typeface="DokChampa"/>
+        <a:font script="Sinh" typeface="Iskoola Pota"/>
+        <a:font script="Mong" typeface="Mongolian Baiti"/>
+        <a:font script="Viet" typeface="Arial"/>
+        <a:font script="Uigh" typeface="Microsoft Uighur"/>
+        <a:font script="Geor" typeface="Sylfaen"/>
+      </a:minorFont>
+    </a:fontScheme>
+    <a:fmtScheme name="Office">
+      <a:fillStyleLst>
+        <a:solidFill>
+          <a:schemeClr val="phClr"/>
+        </a:solidFill>
+        <a:gradFill rotWithShape="1">
+          <a:gsLst>
+            <a:gs pos="0">
+              <a:schemeClr val="phClr">
+                <a:lumMod val="110000"/>
+                <a:satMod val="105000"/>
+                <a:tint val="67000"/>
+              </a:schemeClr>
+            </a:gs>
+            <a:gs pos="50000">
+              <a:schemeClr val="phClr">
+                <a:lumMod val="105000"/>
+                <a:satMod val="103000"/>
+                <a:tint val="73000"/>
+              </a:schemeClr>
+            </a:gs>
+            <a:gs pos="100000">
+              <a:schemeClr val="phClr">
+                <a:lumMod val="105000"/>
+                <a:satMod val="109000"/>
+                <a:tint val="81000"/>
+              </a:schemeClr>
+            </a:gs>
+          </a:gsLst>
+          <a:lin ang="5400000" scaled="0"/>
+        </a:gradFill>
+        <a:gradFill rotWithShape="1">
+          <a:gsLst>
+            <a:gs pos="0">
+              <a:schemeClr val="phClr">
+                <a:satMod val="103000"/>
+                <a:lumMod val="102000"/>
+                <a:tint val="94000"/>
+              </a:schemeClr>
+            </a:gs>
+            <a:gs pos="50000">
+              <a:schemeClr val="phClr">
+                <a:satMod val="110000"/>
+                <a:lumMod val="100000"/>
+                <a:shade val="100000"/>
+              </a:schemeClr>
+            </a:gs>
+            <a:gs pos="100000">
+              <a:schemeClr val="phClr">
+                <a:lumMod val="99000"/>
+                <a:satMod val="120000"/>
+                <a:shade val="78000"/>
+              </a:schemeClr>
+            </a:gs>
+          </a:gsLst>
+          <a:lin ang="5400000" scaled="0"/>
+        </a:gradFill>
+      </a:fillStyleLst>
+      <a:lnStyleLst>
+        <a:ln w="6350" cap="flat" cmpd="sng" algn="ctr">
+          <a:solidFill>
+            <a:schemeClr val="phClr"/>
+          </a:solidFill>
+          <a:prstDash val="solid"/>
+          <a:miter lim="800000"/>
+        </a:ln>
+        <a:ln w="12700" cap="flat" cmpd="sng" algn="ctr">
+          <a:solidFill>
+            <a:schemeClr val="phClr"/>
+          </a:solidFill>
+          <a:prstDash val="solid"/>
+          <a:miter lim="800000"/>
+        </a:ln>
+        <a:ln w="19050" cap="flat" cmpd="sng" algn="ctr">
+          <a:solidFill>
+            <a:schemeClr val="phClr"/>
+          </a:solidFill>
+          <a:prstDash val="solid"/>
+          <a:miter lim="800000"/>
+        </a:ln>
+      </a:lnStyleLst>
+      <a:effectStyleLst>
+        <a:effectStyle>
+          <a:effectLst/>
+        </a:effectStyle>
+        <a:effectStyle>
+          <a:effectLst/>
+        </a:effectStyle>
+        <a:effectStyle>
+          <a:effectLst>
+            <a:outerShdw blurRad="57150" dist="19050" dir="5400000" algn="ctr" rotWithShape="0">
+              <a:srgbClr val="000000">
+                <a:alpha val="63000"/>
+              </a:srgbClr>
+            </a:outerShdw>
+          </a:effectLst>
+        </a:effectStyle>
+      </a:effectStyleLst>
+      <a:bgFillStyleLst>
+        <a:solidFill>
+          <a:schemeClr val="phClr"/>
+        </a:solidFill>
+        <a:solidFill>
+          <a:schemeClr val="phClr">
+            <a:tint val="95000"/>
+            <a:satMod val="170000"/>
+          </a:schemeClr>
+        </a:solidFill>
+        <a:gradFill rotWithShape="1">
+          <a:gsLst>
+            <a:gs pos="0">
+              <a:schemeClr val="phClr">
+                <a:tint val="93000"/>
+                <a:satMod val="150000"/>
+                <a:shade val="98000"/>
+                <a:lumMod val="102000"/>
+              </a:schemeClr>
+            </a:gs>
+            <a:gs pos="50000">
+              <a:schemeClr val="phClr">
+                <a:tint val="98000"/>
+                <a:satMod val="130000"/>
+                <a:shade val="90000"/>
+                <a:lumMod val="103000"/>
+              </a:schemeClr>
+            </a:gs>
+            <a:gs pos="100000">
+              <a:schemeClr val="phClr">
+                <a:shade val="63000"/>
+                <a:satMod val="120000"/>
+              </a:schemeClr>
+            </a:gs>
+          </a:gsLst>
+          <a:lin ang="5400000" scaled="0"/>
+        </a:gradFill>
+      </a:bgFillStyleLst>
+    </a:fmtScheme>
+  </a:themeElements>
+  <a:objectDefaults/>
+  <a:extraClrSchemeLst/>
+  <a:extLst>
+    <a:ext uri="{05A4C25C-085E-4340-85A3-A5531E510DB2}">
+      <thm15:themeFamily xmlns:thm15="http://schemas.microsoft.com/office/thememl/2012/main" name="Office Theme" id="{62F939B6-93AF-4DB8-9C6B-D6C7DFDC589F}" vid="{4A3C46E8-61CC-4603-A589-7422A47A8E4A}"/>
+    </a:ext>
+  </a:extLst>
+</a:theme>
 </file>
</xml_diff>